<commit_message>
Added the LiveDemo page to the presentation
</commit_message>
<xml_diff>
--- a/Docs/60_Projektabschluss/Abschluss_Praesentation_ohne_Bilder.pptx
+++ b/Docs/60_Projektabschluss/Abschluss_Praesentation_ohne_Bilder.pptx
@@ -12,15 +12,16 @@
     <p:sldId id="285" r:id="rId6"/>
     <p:sldId id="295" r:id="rId7"/>
     <p:sldId id="297" r:id="rId8"/>
-    <p:sldId id="272" r:id="rId9"/>
-    <p:sldId id="273" r:id="rId10"/>
-    <p:sldId id="274" r:id="rId11"/>
-    <p:sldId id="275" r:id="rId12"/>
-    <p:sldId id="276" r:id="rId13"/>
-    <p:sldId id="277" r:id="rId14"/>
-    <p:sldId id="294" r:id="rId15"/>
-    <p:sldId id="301" r:id="rId16"/>
-    <p:sldId id="271" r:id="rId17"/>
+    <p:sldId id="302" r:id="rId9"/>
+    <p:sldId id="272" r:id="rId10"/>
+    <p:sldId id="273" r:id="rId11"/>
+    <p:sldId id="274" r:id="rId12"/>
+    <p:sldId id="275" r:id="rId13"/>
+    <p:sldId id="276" r:id="rId14"/>
+    <p:sldId id="277" r:id="rId15"/>
+    <p:sldId id="294" r:id="rId16"/>
+    <p:sldId id="301" r:id="rId17"/>
+    <p:sldId id="271" r:id="rId18"/>
   </p:sldIdLst>
   <p:sldSz cx="12192000" cy="6858000"/>
   <p:notesSz cx="6858000" cy="9144000"/>
@@ -121,7 +122,7 @@
   </p:defaultTextStyle>
   <p:extLst>
     <p:ext uri="{EFAFB233-063F-42B5-8137-9DF3F51BA10A}">
-      <p15:sldGuideLst xmlns="" xmlns:p15="http://schemas.microsoft.com/office/powerpoint/2012/main"/>
+      <p15:sldGuideLst xmlns:p15="http://schemas.microsoft.com/office/powerpoint/2012/main" xmlns=""/>
     </p:ext>
   </p:extLst>
 </p:presentation>
@@ -3418,7 +3419,7 @@
           <a:p>
             <a:r>
               <a:rPr lang="de-DE" dirty="0" smtClean="0"/>
-              <a:t>API / Backend</a:t>
+              <a:t>Datenbank</a:t>
             </a:r>
             <a:endParaRPr lang="de-DE" dirty="0"/>
           </a:p>
@@ -3436,7 +3437,9 @@
         </p:nvSpPr>
         <p:spPr/>
         <p:txBody>
-          <a:bodyPr/>
+          <a:bodyPr>
+            <a:normAutofit lnSpcReduction="10000"/>
+          </a:bodyPr>
           <a:lstStyle/>
           <a:p>
             <a:pPr>
@@ -3444,30 +3447,51 @@
               <a:buChar char="•"/>
             </a:pPr>
             <a:r>
-              <a:rPr lang="en-US" dirty="0" err="1">
+              <a:rPr lang="de-DE" dirty="0">
                 <a:solidFill>
                   <a:srgbClr val="000000"/>
                 </a:solidFill>
               </a:rPr>
-              <a:t>Schnittstelle</a:t>
-            </a:r>
-            <a:r>
-              <a:rPr lang="en-US" dirty="0">
+              <a:t>Ablegen von</a:t>
+            </a:r>
+            <a:endParaRPr lang="de-DE" dirty="0"/>
+          </a:p>
+          <a:p>
+            <a:pPr>
+              <a:buFont typeface="Arial"/>
+              <a:buChar char="•"/>
+            </a:pPr>
+            <a:endParaRPr lang="de-DE" dirty="0"/>
+          </a:p>
+          <a:p>
+            <a:pPr>
+              <a:buFont typeface="Arial"/>
+              <a:buChar char="•"/>
+            </a:pPr>
+            <a:r>
+              <a:rPr lang="de-DE" dirty="0" err="1" smtClean="0">
                 <a:solidFill>
                   <a:srgbClr val="000000"/>
                 </a:solidFill>
               </a:rPr>
-              <a:t> </a:t>
-            </a:r>
-            <a:r>
-              <a:rPr lang="en-US" dirty="0" smtClean="0">
+              <a:t>Produktionformationen</a:t>
+            </a:r>
+            <a:endParaRPr lang="de-DE" dirty="0"/>
+          </a:p>
+          <a:p>
+            <a:pPr lvl="1">
+              <a:buFont typeface="Arial"/>
+              <a:buChar char="•"/>
+            </a:pPr>
+            <a:r>
+              <a:rPr lang="de-DE" sz="2400" dirty="0" smtClean="0">
                 <a:solidFill>
                   <a:srgbClr val="000000"/>
                 </a:solidFill>
               </a:rPr>
-              <a:t>RESTful-API</a:t>
-            </a:r>
-            <a:endParaRPr lang="en-US" dirty="0" smtClean="0"/>
+              <a:t>Produkte</a:t>
+            </a:r>
+            <a:endParaRPr lang="de-DE" dirty="0" smtClean="0"/>
           </a:p>
           <a:p>
             <a:pPr lvl="1">
@@ -3475,100 +3499,45 @@
               <a:buChar char="•"/>
             </a:pPr>
             <a:r>
-              <a:rPr lang="en-US" dirty="0" err="1" smtClean="0">
+              <a:rPr lang="de-DE" dirty="0" smtClean="0">
                 <a:solidFill>
                   <a:srgbClr val="000000"/>
                 </a:solidFill>
               </a:rPr>
-              <a:t>Routen</a:t>
-            </a:r>
-            <a:r>
-              <a:rPr lang="en-US" dirty="0" smtClean="0">
+              <a:t>Inhaltsstoffe </a:t>
+            </a:r>
+            <a:r>
+              <a:rPr lang="de-DE" dirty="0">
                 <a:solidFill>
                   <a:srgbClr val="000000"/>
                 </a:solidFill>
               </a:rPr>
-              <a:t> </a:t>
-            </a:r>
-            <a:r>
-              <a:rPr lang="en-US" dirty="0">
+              <a:t>(inkl. </a:t>
+            </a:r>
+            <a:r>
+              <a:rPr lang="de-DE" dirty="0" smtClean="0">
                 <a:solidFill>
                   <a:srgbClr val="000000"/>
                 </a:solidFill>
               </a:rPr>
-              <a:t>in </a:t>
-            </a:r>
-            <a:r>
-              <a:rPr lang="en-US" dirty="0" err="1">
+              <a:t>Allergiegruppe)</a:t>
+            </a:r>
+            <a:endParaRPr lang="de-DE" dirty="0" smtClean="0"/>
+          </a:p>
+          <a:p>
+            <a:pPr lvl="1">
+              <a:buFont typeface="Arial"/>
+              <a:buChar char="•"/>
+            </a:pPr>
+            <a:r>
+              <a:rPr lang="de-DE" dirty="0" smtClean="0">
                 <a:solidFill>
                   <a:srgbClr val="000000"/>
                 </a:solidFill>
               </a:rPr>
-              <a:t>php</a:t>
-            </a:r>
-            <a:r>
-              <a:rPr lang="en-US" dirty="0">
-                <a:solidFill>
-                  <a:srgbClr val="000000"/>
-                </a:solidFill>
-              </a:rPr>
-              <a:t> </a:t>
-            </a:r>
-            <a:r>
-              <a:rPr lang="en-US" dirty="0" err="1" smtClean="0">
-                <a:solidFill>
-                  <a:srgbClr val="000000"/>
-                </a:solidFill>
-              </a:rPr>
-              <a:t>implementiert</a:t>
-            </a:r>
-            <a:endParaRPr lang="en-US" dirty="0" smtClean="0"/>
-          </a:p>
-          <a:p>
-            <a:pPr lvl="1">
-              <a:buFont typeface="Arial"/>
-              <a:buChar char="•"/>
-            </a:pPr>
-            <a:r>
-              <a:rPr lang="en-US" dirty="0" smtClean="0">
-                <a:solidFill>
-                  <a:srgbClr val="000000"/>
-                </a:solidFill>
-              </a:rPr>
-              <a:t>Web-</a:t>
-            </a:r>
-            <a:r>
-              <a:rPr lang="en-US" dirty="0" err="1" smtClean="0">
-                <a:solidFill>
-                  <a:srgbClr val="000000"/>
-                </a:solidFill>
-              </a:rPr>
-              <a:t>Applikation</a:t>
-            </a:r>
-            <a:endParaRPr lang="en-US" dirty="0" smtClean="0"/>
-          </a:p>
-          <a:p>
-            <a:pPr lvl="1">
-              <a:buFont typeface="Arial"/>
-              <a:buChar char="•"/>
-            </a:pPr>
-            <a:r>
-              <a:rPr lang="en-US" dirty="0" smtClean="0">
-                <a:solidFill>
-                  <a:srgbClr val="000000"/>
-                </a:solidFill>
-              </a:rPr>
-              <a:t>HMD-</a:t>
-            </a:r>
-            <a:r>
-              <a:rPr lang="en-US" dirty="0" err="1" smtClean="0">
-                <a:solidFill>
-                  <a:srgbClr val="000000"/>
-                </a:solidFill>
-              </a:rPr>
-              <a:t>Applikation</a:t>
-            </a:r>
-            <a:endParaRPr lang="en-US" dirty="0"/>
+              <a:t>Barcode</a:t>
+            </a:r>
+            <a:endParaRPr lang="de-DE" dirty="0"/>
           </a:p>
           <a:p>
             <a:pPr lvl="1">
@@ -3576,7 +3545,7 @@
               <a:buFont typeface="StarSymbol"/>
               <a:buChar char=""/>
             </a:pPr>
-            <a:endParaRPr lang="en-US" dirty="0"/>
+            <a:endParaRPr lang="de-DE" dirty="0"/>
           </a:p>
           <a:p>
             <a:pPr>
@@ -3584,52 +3553,59 @@
               <a:buChar char="•"/>
             </a:pPr>
             <a:r>
-              <a:rPr lang="en-US" dirty="0" err="1">
+              <a:rPr lang="de-DE" dirty="0" smtClean="0">
                 <a:solidFill>
                   <a:srgbClr val="000000"/>
                 </a:solidFill>
               </a:rPr>
-              <a:t>Repräsentation</a:t>
-            </a:r>
-            <a:r>
-              <a:rPr lang="en-US" dirty="0">
+              <a:t>Userinformationen</a:t>
+            </a:r>
+            <a:endParaRPr lang="de-DE" dirty="0" smtClean="0"/>
+          </a:p>
+          <a:p>
+            <a:pPr lvl="1">
+              <a:buFont typeface="Arial"/>
+              <a:buChar char="•"/>
+            </a:pPr>
+            <a:r>
+              <a:rPr lang="de-DE" dirty="0" smtClean="0">
                 <a:solidFill>
                   <a:srgbClr val="000000"/>
                 </a:solidFill>
               </a:rPr>
-              <a:t> der </a:t>
-            </a:r>
-            <a:r>
-              <a:rPr lang="en-US" dirty="0" err="1" smtClean="0">
+              <a:t>Authentifizierungsdaten</a:t>
+            </a:r>
+            <a:endParaRPr lang="de-DE" dirty="0" smtClean="0"/>
+          </a:p>
+          <a:p>
+            <a:pPr lvl="1">
+              <a:buFont typeface="Arial"/>
+              <a:buChar char="•"/>
+            </a:pPr>
+            <a:r>
+              <a:rPr lang="de-DE" dirty="0" smtClean="0">
                 <a:solidFill>
                   <a:srgbClr val="000000"/>
                 </a:solidFill>
               </a:rPr>
-              <a:t>Daten</a:t>
-            </a:r>
-            <a:endParaRPr lang="en-US" dirty="0" smtClean="0"/>
-          </a:p>
-          <a:p>
-            <a:pPr lvl="1">
-              <a:buFont typeface="Arial"/>
-              <a:buChar char="•"/>
-            </a:pPr>
-            <a:r>
-              <a:rPr lang="en-US" sz="2400" dirty="0" smtClean="0">
+              <a:t>Gekoppelte </a:t>
+            </a:r>
+            <a:r>
+              <a:rPr lang="de-DE" dirty="0">
                 <a:solidFill>
                   <a:srgbClr val="000000"/>
                 </a:solidFill>
               </a:rPr>
-              <a:t>JSON</a:t>
-            </a:r>
-            <a:endParaRPr lang="en-US" dirty="0"/>
+              <a:t>Geräte</a:t>
+            </a:r>
+            <a:endParaRPr lang="de-DE" dirty="0"/>
           </a:p>
         </p:txBody>
       </p:sp>
     </p:spTree>
     <p:extLst>
       <p:ext uri="{BB962C8B-B14F-4D97-AF65-F5344CB8AC3E}">
-        <p14:creationId xmlns:p14="http://schemas.microsoft.com/office/powerpoint/2010/main" val="2786761497"/>
+        <p14:creationId xmlns:p14="http://schemas.microsoft.com/office/powerpoint/2010/main" val="1588141210"/>
       </p:ext>
     </p:extLst>
   </p:cSld>
@@ -3680,7 +3656,7 @@
           <a:p>
             <a:r>
               <a:rPr lang="de-DE" dirty="0" smtClean="0"/>
-              <a:t>Frontend</a:t>
+              <a:t>API / Backend</a:t>
             </a:r>
             <a:endParaRPr lang="de-DE" dirty="0"/>
           </a:p>
@@ -3711,90 +3687,7 @@
                   <a:srgbClr val="000000"/>
                 </a:solidFill>
               </a:rPr>
-              <a:t>Konfiguration</a:t>
-            </a:r>
-            <a:r>
-              <a:rPr lang="en-US" dirty="0">
-                <a:solidFill>
-                  <a:srgbClr val="000000"/>
-                </a:solidFill>
-              </a:rPr>
-              <a:t> der HMD-App </a:t>
-            </a:r>
-            <a:r>
-              <a:rPr lang="en-US" dirty="0" smtClean="0">
-                <a:solidFill>
-                  <a:srgbClr val="000000"/>
-                </a:solidFill>
-              </a:rPr>
-              <a:t>via</a:t>
-            </a:r>
-            <a:endParaRPr lang="en-US" dirty="0" smtClean="0"/>
-          </a:p>
-          <a:p>
-            <a:pPr lvl="1">
-              <a:buFont typeface="Arial"/>
-              <a:buChar char="•"/>
-            </a:pPr>
-            <a:r>
-              <a:rPr lang="en-US" dirty="0" smtClean="0">
-                <a:solidFill>
-                  <a:srgbClr val="000000"/>
-                </a:solidFill>
-              </a:rPr>
-              <a:t>Desktop</a:t>
-            </a:r>
-            <a:endParaRPr lang="en-US" dirty="0" smtClean="0"/>
-          </a:p>
-          <a:p>
-            <a:pPr lvl="1">
-              <a:buFont typeface="Arial"/>
-              <a:buChar char="•"/>
-            </a:pPr>
-            <a:r>
-              <a:rPr lang="en-US" dirty="0" smtClean="0">
-                <a:solidFill>
-                  <a:srgbClr val="000000"/>
-                </a:solidFill>
-              </a:rPr>
-              <a:t>Tablet</a:t>
-            </a:r>
-            <a:endParaRPr lang="en-US" dirty="0" smtClean="0"/>
-          </a:p>
-          <a:p>
-            <a:pPr lvl="1">
-              <a:buFont typeface="Arial"/>
-              <a:buChar char="•"/>
-            </a:pPr>
-            <a:r>
-              <a:rPr lang="en-US" dirty="0" smtClean="0">
-                <a:solidFill>
-                  <a:srgbClr val="000000"/>
-                </a:solidFill>
-              </a:rPr>
-              <a:t>Smartphone</a:t>
-            </a:r>
-            <a:endParaRPr lang="en-US" dirty="0" smtClean="0"/>
-          </a:p>
-          <a:p>
-            <a:pPr lvl="1">
-              <a:buFont typeface="Arial"/>
-              <a:buChar char="•"/>
-            </a:pPr>
-            <a:endParaRPr lang="en-US" dirty="0"/>
-          </a:p>
-          <a:p>
-            <a:pPr>
-              <a:buFont typeface="Arial"/>
-              <a:buChar char="•"/>
-            </a:pPr>
-            <a:r>
-              <a:rPr lang="en-US" dirty="0" err="1">
-                <a:solidFill>
-                  <a:srgbClr val="000000"/>
-                </a:solidFill>
-              </a:rPr>
-              <a:t>Keine</a:t>
+              <a:t>Schnittstelle</a:t>
             </a:r>
             <a:r>
               <a:rPr lang="en-US" dirty="0">
@@ -3805,12 +3698,51 @@
               <a:t> </a:t>
             </a:r>
             <a:r>
+              <a:rPr lang="en-US" dirty="0" smtClean="0">
+                <a:solidFill>
+                  <a:srgbClr val="000000"/>
+                </a:solidFill>
+              </a:rPr>
+              <a:t>RESTful-API</a:t>
+            </a:r>
+            <a:endParaRPr lang="en-US" dirty="0" smtClean="0"/>
+          </a:p>
+          <a:p>
+            <a:pPr lvl="1">
+              <a:buFont typeface="Arial"/>
+              <a:buChar char="•"/>
+            </a:pPr>
+            <a:r>
+              <a:rPr lang="en-US" dirty="0" err="1" smtClean="0">
+                <a:solidFill>
+                  <a:srgbClr val="000000"/>
+                </a:solidFill>
+              </a:rPr>
+              <a:t>Routen</a:t>
+            </a:r>
+            <a:r>
+              <a:rPr lang="en-US" dirty="0" smtClean="0">
+                <a:solidFill>
+                  <a:srgbClr val="000000"/>
+                </a:solidFill>
+              </a:rPr>
+              <a:t> </a:t>
+            </a:r>
+            <a:r>
+              <a:rPr lang="en-US" dirty="0">
+                <a:solidFill>
+                  <a:srgbClr val="000000"/>
+                </a:solidFill>
+              </a:rPr>
+              <a:t>in </a:t>
+            </a:r>
+            <a:r>
               <a:rPr lang="en-US" dirty="0" err="1">
                 <a:solidFill>
                   <a:srgbClr val="000000"/>
                 </a:solidFill>
               </a:rPr>
-              <a:t>komplizierten</a:t>
+              <a:t>php</a:t>
             </a:r>
             <a:r>
               <a:rPr lang="en-US" dirty="0">
@@ -3821,12 +3753,112 @@
               <a:t> </a:t>
             </a:r>
             <a:r>
+              <a:rPr lang="en-US" dirty="0" err="1" smtClean="0">
+                <a:solidFill>
+                  <a:srgbClr val="000000"/>
+                </a:solidFill>
+              </a:rPr>
+              <a:t>implementiert</a:t>
+            </a:r>
+            <a:endParaRPr lang="en-US" dirty="0" smtClean="0"/>
+          </a:p>
+          <a:p>
+            <a:pPr lvl="1">
+              <a:buFont typeface="Arial"/>
+              <a:buChar char="•"/>
+            </a:pPr>
+            <a:r>
+              <a:rPr lang="en-US" dirty="0" smtClean="0">
+                <a:solidFill>
+                  <a:srgbClr val="000000"/>
+                </a:solidFill>
+              </a:rPr>
+              <a:t>Web-</a:t>
+            </a:r>
+            <a:r>
+              <a:rPr lang="en-US" dirty="0" err="1" smtClean="0">
+                <a:solidFill>
+                  <a:srgbClr val="000000"/>
+                </a:solidFill>
+              </a:rPr>
+              <a:t>Applikation</a:t>
+            </a:r>
+            <a:endParaRPr lang="en-US" dirty="0" smtClean="0"/>
+          </a:p>
+          <a:p>
+            <a:pPr lvl="1">
+              <a:buFont typeface="Arial"/>
+              <a:buChar char="•"/>
+            </a:pPr>
+            <a:r>
+              <a:rPr lang="en-US" dirty="0" smtClean="0">
+                <a:solidFill>
+                  <a:srgbClr val="000000"/>
+                </a:solidFill>
+              </a:rPr>
+              <a:t>HMD-</a:t>
+            </a:r>
+            <a:r>
+              <a:rPr lang="en-US" dirty="0" err="1" smtClean="0">
+                <a:solidFill>
+                  <a:srgbClr val="000000"/>
+                </a:solidFill>
+              </a:rPr>
+              <a:t>Applikation</a:t>
+            </a:r>
+            <a:endParaRPr lang="en-US" dirty="0"/>
+          </a:p>
+          <a:p>
+            <a:pPr lvl="1">
+              <a:buSzPct val="45000"/>
+              <a:buFont typeface="StarSymbol"/>
+              <a:buChar char=""/>
+            </a:pPr>
+            <a:endParaRPr lang="en-US" dirty="0"/>
+          </a:p>
+          <a:p>
+            <a:pPr>
+              <a:buFont typeface="Arial"/>
+              <a:buChar char="•"/>
+            </a:pPr>
+            <a:r>
               <a:rPr lang="en-US" dirty="0" err="1">
                 <a:solidFill>
                   <a:srgbClr val="000000"/>
                 </a:solidFill>
               </a:rPr>
-              <a:t>Eingabemethoden</a:t>
+              <a:t>Repräsentation</a:t>
+            </a:r>
+            <a:r>
+              <a:rPr lang="en-US" dirty="0">
+                <a:solidFill>
+                  <a:srgbClr val="000000"/>
+                </a:solidFill>
+              </a:rPr>
+              <a:t> der </a:t>
+            </a:r>
+            <a:r>
+              <a:rPr lang="en-US" dirty="0" err="1" smtClean="0">
+                <a:solidFill>
+                  <a:srgbClr val="000000"/>
+                </a:solidFill>
+              </a:rPr>
+              <a:t>Daten</a:t>
+            </a:r>
+            <a:endParaRPr lang="en-US" dirty="0" smtClean="0"/>
+          </a:p>
+          <a:p>
+            <a:pPr lvl="1">
+              <a:buFont typeface="Arial"/>
+              <a:buChar char="•"/>
+            </a:pPr>
+            <a:r>
+              <a:rPr lang="en-US" sz="2400" dirty="0" smtClean="0">
+                <a:solidFill>
+                  <a:srgbClr val="000000"/>
+                </a:solidFill>
+              </a:rPr>
+              <a:t>JSON</a:t>
             </a:r>
             <a:endParaRPr lang="en-US" dirty="0"/>
           </a:p>
@@ -3835,7 +3867,7 @@
     </p:spTree>
     <p:extLst>
       <p:ext uri="{BB962C8B-B14F-4D97-AF65-F5344CB8AC3E}">
-        <p14:creationId xmlns:p14="http://schemas.microsoft.com/office/powerpoint/2010/main" val="3301113212"/>
+        <p14:creationId xmlns:p14="http://schemas.microsoft.com/office/powerpoint/2010/main" val="2786761497"/>
       </p:ext>
     </p:extLst>
   </p:cSld>
@@ -3881,18 +3913,12 @@
         </p:nvSpPr>
         <p:spPr/>
         <p:txBody>
-          <a:bodyPr>
-            <a:normAutofit/>
-          </a:bodyPr>
+          <a:bodyPr/>
           <a:lstStyle/>
           <a:p>
             <a:r>
-              <a:rPr lang="de-DE" dirty="0" err="1" smtClean="0"/>
-              <a:t>Vuzix</a:t>
-            </a:r>
-            <a:r>
               <a:rPr lang="de-DE" dirty="0" smtClean="0"/>
-              <a:t>-App</a:t>
+              <a:t>Frontend</a:t>
             </a:r>
             <a:endParaRPr lang="de-DE" dirty="0"/>
           </a:p>
@@ -3923,7 +3949,90 @@
                   <a:srgbClr val="000000"/>
                 </a:solidFill>
               </a:rPr>
-              <a:t>Produkt</a:t>
+              <a:t>Konfiguration</a:t>
+            </a:r>
+            <a:r>
+              <a:rPr lang="en-US" dirty="0">
+                <a:solidFill>
+                  <a:srgbClr val="000000"/>
+                </a:solidFill>
+              </a:rPr>
+              <a:t> der HMD-App </a:t>
+            </a:r>
+            <a:r>
+              <a:rPr lang="en-US" dirty="0" smtClean="0">
+                <a:solidFill>
+                  <a:srgbClr val="000000"/>
+                </a:solidFill>
+              </a:rPr>
+              <a:t>via</a:t>
+            </a:r>
+            <a:endParaRPr lang="en-US" dirty="0" smtClean="0"/>
+          </a:p>
+          <a:p>
+            <a:pPr lvl="1">
+              <a:buFont typeface="Arial"/>
+              <a:buChar char="•"/>
+            </a:pPr>
+            <a:r>
+              <a:rPr lang="en-US" dirty="0" smtClean="0">
+                <a:solidFill>
+                  <a:srgbClr val="000000"/>
+                </a:solidFill>
+              </a:rPr>
+              <a:t>Desktop</a:t>
+            </a:r>
+            <a:endParaRPr lang="en-US" dirty="0" smtClean="0"/>
+          </a:p>
+          <a:p>
+            <a:pPr lvl="1">
+              <a:buFont typeface="Arial"/>
+              <a:buChar char="•"/>
+            </a:pPr>
+            <a:r>
+              <a:rPr lang="en-US" dirty="0" smtClean="0">
+                <a:solidFill>
+                  <a:srgbClr val="000000"/>
+                </a:solidFill>
+              </a:rPr>
+              <a:t>Tablet</a:t>
+            </a:r>
+            <a:endParaRPr lang="en-US" dirty="0" smtClean="0"/>
+          </a:p>
+          <a:p>
+            <a:pPr lvl="1">
+              <a:buFont typeface="Arial"/>
+              <a:buChar char="•"/>
+            </a:pPr>
+            <a:r>
+              <a:rPr lang="en-US" dirty="0" smtClean="0">
+                <a:solidFill>
+                  <a:srgbClr val="000000"/>
+                </a:solidFill>
+              </a:rPr>
+              <a:t>Smartphone</a:t>
+            </a:r>
+            <a:endParaRPr lang="en-US" dirty="0" smtClean="0"/>
+          </a:p>
+          <a:p>
+            <a:pPr lvl="1">
+              <a:buFont typeface="Arial"/>
+              <a:buChar char="•"/>
+            </a:pPr>
+            <a:endParaRPr lang="en-US" dirty="0"/>
+          </a:p>
+          <a:p>
+            <a:pPr>
+              <a:buFont typeface="Arial"/>
+              <a:buChar char="•"/>
+            </a:pPr>
+            <a:r>
+              <a:rPr lang="en-US" dirty="0" err="1">
+                <a:solidFill>
+                  <a:srgbClr val="000000"/>
+                </a:solidFill>
+              </a:rPr>
+              <a:t>Keine</a:t>
             </a:r>
             <a:r>
               <a:rPr lang="en-US" dirty="0">
@@ -3939,7 +4048,7 @@
                   <a:srgbClr val="000000"/>
                 </a:solidFill>
               </a:rPr>
-              <a:t>beim</a:t>
+              <a:t>komplizierten</a:t>
             </a:r>
             <a:r>
               <a:rPr lang="en-US" dirty="0">
@@ -3955,258 +4064,7 @@
                   <a:srgbClr val="000000"/>
                 </a:solidFill>
               </a:rPr>
-              <a:t>Einkauf</a:t>
-            </a:r>
-            <a:r>
-              <a:rPr lang="en-US" dirty="0">
-                <a:solidFill>
-                  <a:srgbClr val="000000"/>
-                </a:solidFill>
-              </a:rPr>
-              <a:t> </a:t>
-            </a:r>
-            <a:r>
-              <a:rPr lang="en-US" dirty="0" err="1" smtClean="0">
-                <a:solidFill>
-                  <a:srgbClr val="000000"/>
-                </a:solidFill>
-              </a:rPr>
-              <a:t>überprüfen</a:t>
-            </a:r>
-            <a:endParaRPr lang="en-US" dirty="0" smtClean="0"/>
-          </a:p>
-          <a:p>
-            <a:pPr lvl="1">
-              <a:buFont typeface="Arial"/>
-              <a:buChar char="•"/>
-            </a:pPr>
-            <a:r>
-              <a:rPr lang="en-US" dirty="0" err="1" smtClean="0">
-                <a:solidFill>
-                  <a:srgbClr val="000000"/>
-                </a:solidFill>
-              </a:rPr>
-              <a:t>Barcodescan</a:t>
-            </a:r>
-            <a:r>
-              <a:rPr lang="en-US" dirty="0" smtClean="0">
-                <a:solidFill>
-                  <a:srgbClr val="000000"/>
-                </a:solidFill>
-              </a:rPr>
-              <a:t> </a:t>
-            </a:r>
-            <a:r>
-              <a:rPr lang="en-US" dirty="0" err="1">
-                <a:solidFill>
-                  <a:srgbClr val="000000"/>
-                </a:solidFill>
-              </a:rPr>
-              <a:t>durch</a:t>
-            </a:r>
-            <a:r>
-              <a:rPr lang="en-US" dirty="0">
-                <a:solidFill>
-                  <a:srgbClr val="000000"/>
-                </a:solidFill>
-              </a:rPr>
-              <a:t> </a:t>
-            </a:r>
-            <a:r>
-              <a:rPr lang="en-US" dirty="0" err="1">
-                <a:solidFill>
-                  <a:srgbClr val="000000"/>
-                </a:solidFill>
-              </a:rPr>
-              <a:t>Sprachbefehl</a:t>
-            </a:r>
-            <a:r>
-              <a:rPr lang="en-US" dirty="0">
-                <a:solidFill>
-                  <a:srgbClr val="000000"/>
-                </a:solidFill>
-              </a:rPr>
-              <a:t> </a:t>
-            </a:r>
-            <a:r>
-              <a:rPr lang="en-US" dirty="0" err="1" smtClean="0">
-                <a:solidFill>
-                  <a:srgbClr val="000000"/>
-                </a:solidFill>
-              </a:rPr>
-              <a:t>initiiert</a:t>
-            </a:r>
-            <a:endParaRPr lang="en-US" dirty="0" smtClean="0"/>
-          </a:p>
-          <a:p>
-            <a:pPr lvl="1">
-              <a:buFont typeface="Arial"/>
-              <a:buChar char="•"/>
-            </a:pPr>
-            <a:r>
-              <a:rPr lang="en-US" dirty="0" err="1" smtClean="0">
-                <a:solidFill>
-                  <a:srgbClr val="000000"/>
-                </a:solidFill>
-              </a:rPr>
-              <a:t>Optische</a:t>
-            </a:r>
-            <a:r>
-              <a:rPr lang="en-US" dirty="0" smtClean="0">
-                <a:solidFill>
-                  <a:srgbClr val="000000"/>
-                </a:solidFill>
-              </a:rPr>
-              <a:t> </a:t>
-            </a:r>
-            <a:r>
-              <a:rPr lang="en-US" dirty="0" err="1">
-                <a:solidFill>
-                  <a:srgbClr val="000000"/>
-                </a:solidFill>
-              </a:rPr>
-              <a:t>Rückmeldung</a:t>
-            </a:r>
-            <a:r>
-              <a:rPr lang="en-US" dirty="0">
-                <a:solidFill>
-                  <a:srgbClr val="000000"/>
-                </a:solidFill>
-              </a:rPr>
-              <a:t> </a:t>
-            </a:r>
-            <a:r>
-              <a:rPr lang="en-US" dirty="0" err="1">
-                <a:solidFill>
-                  <a:srgbClr val="000000"/>
-                </a:solidFill>
-              </a:rPr>
-              <a:t>ob</a:t>
-            </a:r>
-            <a:r>
-              <a:rPr lang="en-US" dirty="0">
-                <a:solidFill>
-                  <a:srgbClr val="000000"/>
-                </a:solidFill>
-              </a:rPr>
-              <a:t> </a:t>
-            </a:r>
-            <a:r>
-              <a:rPr lang="en-US" dirty="0" err="1">
-                <a:solidFill>
-                  <a:srgbClr val="000000"/>
-                </a:solidFill>
-              </a:rPr>
-              <a:t>verzehrbar</a:t>
-            </a:r>
-            <a:endParaRPr lang="en-US" dirty="0"/>
-          </a:p>
-          <a:p>
-            <a:pPr lvl="2">
-              <a:buSzPct val="45000"/>
-              <a:buFont typeface="StarSymbol"/>
-              <a:buChar char=""/>
-            </a:pPr>
-            <a:endParaRPr lang="en-US" dirty="0"/>
-          </a:p>
-          <a:p>
-            <a:pPr>
-              <a:buFont typeface="Arial"/>
-              <a:buChar char="•"/>
-            </a:pPr>
-            <a:r>
-              <a:rPr lang="en-US" dirty="0" err="1">
-                <a:solidFill>
-                  <a:srgbClr val="000000"/>
-                </a:solidFill>
-              </a:rPr>
-              <a:t>Kommunikation</a:t>
-            </a:r>
-            <a:r>
-              <a:rPr lang="en-US" dirty="0">
-                <a:solidFill>
-                  <a:srgbClr val="000000"/>
-                </a:solidFill>
-              </a:rPr>
-              <a:t> via RESTful-API </a:t>
-            </a:r>
-            <a:r>
-              <a:rPr lang="en-US" dirty="0" err="1">
-                <a:solidFill>
-                  <a:srgbClr val="000000"/>
-                </a:solidFill>
-              </a:rPr>
-              <a:t>mit</a:t>
-            </a:r>
-            <a:r>
-              <a:rPr lang="en-US" dirty="0">
-                <a:solidFill>
-                  <a:srgbClr val="000000"/>
-                </a:solidFill>
-              </a:rPr>
-              <a:t> Server</a:t>
-            </a:r>
-            <a:endParaRPr lang="en-US" dirty="0"/>
-          </a:p>
-          <a:p>
-            <a:pPr>
-              <a:buFont typeface="Arial"/>
-              <a:buChar char="•"/>
-            </a:pPr>
-            <a:endParaRPr lang="en-US" dirty="0"/>
-          </a:p>
-          <a:p>
-            <a:pPr>
-              <a:buFont typeface="Arial"/>
-              <a:buChar char="•"/>
-            </a:pPr>
-            <a:r>
-              <a:rPr lang="en-US" dirty="0" err="1">
-                <a:solidFill>
-                  <a:srgbClr val="000000"/>
-                </a:solidFill>
-              </a:rPr>
-              <a:t>Geräte</a:t>
-            </a:r>
-            <a:r>
-              <a:rPr lang="en-US" dirty="0">
-                <a:solidFill>
-                  <a:srgbClr val="000000"/>
-                </a:solidFill>
-              </a:rPr>
-              <a:t>-Account-</a:t>
-            </a:r>
-            <a:r>
-              <a:rPr lang="en-US" dirty="0" err="1">
-                <a:solidFill>
-                  <a:srgbClr val="000000"/>
-                </a:solidFill>
-              </a:rPr>
-              <a:t>Kopplung</a:t>
-            </a:r>
-            <a:r>
-              <a:rPr lang="en-US" dirty="0">
-                <a:solidFill>
-                  <a:srgbClr val="000000"/>
-                </a:solidFill>
-              </a:rPr>
-              <a:t> </a:t>
-            </a:r>
-            <a:r>
-              <a:rPr lang="en-US" dirty="0" err="1">
-                <a:solidFill>
-                  <a:srgbClr val="000000"/>
-                </a:solidFill>
-              </a:rPr>
-              <a:t>mittels</a:t>
-            </a:r>
-            <a:r>
-              <a:rPr lang="en-US" dirty="0">
-                <a:solidFill>
-                  <a:srgbClr val="000000"/>
-                </a:solidFill>
-              </a:rPr>
-              <a:t> Barcode</a:t>
+              <a:t>Eingabemethoden</a:t>
             </a:r>
             <a:endParaRPr lang="en-US" dirty="0"/>
           </a:p>
@@ -4215,7 +4073,7 @@
     </p:spTree>
     <p:extLst>
       <p:ext uri="{BB962C8B-B14F-4D97-AF65-F5344CB8AC3E}">
-        <p14:creationId xmlns:p14="http://schemas.microsoft.com/office/powerpoint/2010/main" val="2561323560"/>
+        <p14:creationId xmlns:p14="http://schemas.microsoft.com/office/powerpoint/2010/main" val="3301113212"/>
       </p:ext>
     </p:extLst>
   </p:cSld>
@@ -4268,15 +4126,11 @@
           <a:p>
             <a:r>
               <a:rPr lang="de-DE" dirty="0" err="1" smtClean="0"/>
-              <a:t>Lesson</a:t>
+              <a:t>Vuzix</a:t>
             </a:r>
             <a:r>
               <a:rPr lang="de-DE" dirty="0" smtClean="0"/>
-              <a:t> </a:t>
-            </a:r>
-            <a:r>
-              <a:rPr lang="de-DE" dirty="0" err="1" smtClean="0"/>
-              <a:t>learned</a:t>
+              <a:t>-App</a:t>
             </a:r>
             <a:endParaRPr lang="de-DE" dirty="0"/>
           </a:p>
@@ -4294,114 +4148,312 @@
         </p:nvSpPr>
         <p:spPr/>
         <p:txBody>
-          <a:bodyPr>
-            <a:normAutofit/>
-          </a:bodyPr>
+          <a:bodyPr/>
           <a:lstStyle/>
           <a:p>
-            <a:r>
-              <a:rPr lang="de-DE" dirty="0"/>
-              <a:t>Ablauf eines </a:t>
-            </a:r>
-            <a:r>
-              <a:rPr lang="de-DE" dirty="0" smtClean="0"/>
-              <a:t>kompletten </a:t>
-            </a:r>
-            <a:r>
-              <a:rPr lang="de-DE" dirty="0" err="1" smtClean="0"/>
-              <a:t>Scrum</a:t>
-            </a:r>
-            <a:r>
-              <a:rPr lang="de-DE" dirty="0" smtClean="0"/>
-              <a:t> Projekts</a:t>
-            </a:r>
-          </a:p>
-          <a:p>
-            <a:pPr lvl="1"/>
-            <a:r>
-              <a:rPr lang="de-DE" dirty="0" smtClean="0"/>
-              <a:t>6 Sprintwechsel</a:t>
-            </a:r>
-          </a:p>
-          <a:p>
-            <a:pPr lvl="2"/>
-            <a:r>
-              <a:rPr lang="de-DE" dirty="0" smtClean="0"/>
-              <a:t>Abnahme von </a:t>
-            </a:r>
-            <a:r>
-              <a:rPr lang="de-DE" dirty="0" err="1" smtClean="0"/>
-              <a:t>Issues</a:t>
-            </a:r>
-            <a:endParaRPr lang="de-DE" dirty="0" smtClean="0"/>
-          </a:p>
-          <a:p>
-            <a:pPr lvl="2"/>
-            <a:r>
-              <a:rPr lang="de-DE" dirty="0" smtClean="0"/>
-              <a:t>Retrospektive</a:t>
-            </a:r>
-          </a:p>
-          <a:p>
-            <a:pPr lvl="2"/>
-            <a:r>
-              <a:rPr lang="de-DE" dirty="0" smtClean="0"/>
-              <a:t>Verteilung von </a:t>
-            </a:r>
-            <a:r>
-              <a:rPr lang="de-DE" dirty="0" err="1" smtClean="0"/>
-              <a:t>Issues</a:t>
-            </a:r>
-            <a:endParaRPr lang="de-DE" dirty="0" smtClean="0"/>
-          </a:p>
-          <a:p>
-            <a:pPr lvl="2"/>
-            <a:endParaRPr lang="de-DE" dirty="0" smtClean="0"/>
-          </a:p>
-          <a:p>
-            <a:r>
-              <a:rPr lang="de-DE" dirty="0" smtClean="0"/>
-              <a:t>Projekt </a:t>
-            </a:r>
-            <a:r>
-              <a:rPr lang="de-DE" dirty="0"/>
-              <a:t>Retrospektive</a:t>
-            </a:r>
-          </a:p>
-          <a:p>
-            <a:pPr lvl="1"/>
-            <a:r>
-              <a:rPr lang="de-DE" dirty="0"/>
-              <a:t>Abwägung ob </a:t>
-            </a:r>
-            <a:r>
-              <a:rPr lang="de-DE" dirty="0" err="1"/>
-              <a:t>Scrum</a:t>
-            </a:r>
-            <a:r>
-              <a:rPr lang="de-DE" dirty="0"/>
-              <a:t> für </a:t>
-            </a:r>
-            <a:r>
-              <a:rPr lang="de-DE" dirty="0" smtClean="0"/>
-              <a:t>kleine/studentische </a:t>
-            </a:r>
-            <a:r>
-              <a:rPr lang="de-DE" dirty="0"/>
-              <a:t>Projekte </a:t>
-            </a:r>
-            <a:r>
-              <a:rPr lang="de-DE" dirty="0" smtClean="0"/>
-              <a:t>geeignet</a:t>
-            </a:r>
-            <a:endParaRPr lang="de-DE" dirty="0"/>
+            <a:pPr>
+              <a:buFont typeface="Arial"/>
+              <a:buChar char="•"/>
+            </a:pPr>
+            <a:r>
+              <a:rPr lang="en-US" dirty="0" err="1">
+                <a:solidFill>
+                  <a:srgbClr val="000000"/>
+                </a:solidFill>
+              </a:rPr>
+              <a:t>Produkt</a:t>
+            </a:r>
+            <a:r>
+              <a:rPr lang="en-US" dirty="0">
+                <a:solidFill>
+                  <a:srgbClr val="000000"/>
+                </a:solidFill>
+              </a:rPr>
+              <a:t> </a:t>
+            </a:r>
+            <a:r>
+              <a:rPr lang="en-US" dirty="0" err="1">
+                <a:solidFill>
+                  <a:srgbClr val="000000"/>
+                </a:solidFill>
+              </a:rPr>
+              <a:t>beim</a:t>
+            </a:r>
+            <a:r>
+              <a:rPr lang="en-US" dirty="0">
+                <a:solidFill>
+                  <a:srgbClr val="000000"/>
+                </a:solidFill>
+              </a:rPr>
+              <a:t> </a:t>
+            </a:r>
+            <a:r>
+              <a:rPr lang="en-US" dirty="0" err="1">
+                <a:solidFill>
+                  <a:srgbClr val="000000"/>
+                </a:solidFill>
+              </a:rPr>
+              <a:t>Einkauf</a:t>
+            </a:r>
+            <a:r>
+              <a:rPr lang="en-US" dirty="0">
+                <a:solidFill>
+                  <a:srgbClr val="000000"/>
+                </a:solidFill>
+              </a:rPr>
+              <a:t> </a:t>
+            </a:r>
+            <a:r>
+              <a:rPr lang="en-US" dirty="0" err="1" smtClean="0">
+                <a:solidFill>
+                  <a:srgbClr val="000000"/>
+                </a:solidFill>
+              </a:rPr>
+              <a:t>überprüfen</a:t>
+            </a:r>
+            <a:endParaRPr lang="en-US" dirty="0" smtClean="0"/>
+          </a:p>
+          <a:p>
+            <a:pPr lvl="1">
+              <a:buFont typeface="Arial"/>
+              <a:buChar char="•"/>
+            </a:pPr>
+            <a:r>
+              <a:rPr lang="en-US" dirty="0" err="1" smtClean="0">
+                <a:solidFill>
+                  <a:srgbClr val="000000"/>
+                </a:solidFill>
+              </a:rPr>
+              <a:t>Barcodescan</a:t>
+            </a:r>
+            <a:r>
+              <a:rPr lang="en-US" dirty="0" smtClean="0">
+                <a:solidFill>
+                  <a:srgbClr val="000000"/>
+                </a:solidFill>
+              </a:rPr>
+              <a:t> </a:t>
+            </a:r>
+            <a:r>
+              <a:rPr lang="en-US" dirty="0" err="1">
+                <a:solidFill>
+                  <a:srgbClr val="000000"/>
+                </a:solidFill>
+              </a:rPr>
+              <a:t>durch</a:t>
+            </a:r>
+            <a:r>
+              <a:rPr lang="en-US" dirty="0">
+                <a:solidFill>
+                  <a:srgbClr val="000000"/>
+                </a:solidFill>
+              </a:rPr>
+              <a:t> </a:t>
+            </a:r>
+            <a:r>
+              <a:rPr lang="en-US" dirty="0" err="1">
+                <a:solidFill>
+                  <a:srgbClr val="000000"/>
+                </a:solidFill>
+              </a:rPr>
+              <a:t>Sprachbefehl</a:t>
+            </a:r>
+            <a:r>
+              <a:rPr lang="en-US" dirty="0">
+                <a:solidFill>
+                  <a:srgbClr val="000000"/>
+                </a:solidFill>
+              </a:rPr>
+              <a:t> </a:t>
+            </a:r>
+            <a:r>
+              <a:rPr lang="en-US" dirty="0" err="1" smtClean="0">
+                <a:solidFill>
+                  <a:srgbClr val="000000"/>
+                </a:solidFill>
+              </a:rPr>
+              <a:t>initiiert</a:t>
+            </a:r>
+            <a:endParaRPr lang="en-US" dirty="0" smtClean="0"/>
+          </a:p>
+          <a:p>
+            <a:pPr lvl="1">
+              <a:buFont typeface="Arial"/>
+              <a:buChar char="•"/>
+            </a:pPr>
+            <a:r>
+              <a:rPr lang="en-US" dirty="0" err="1" smtClean="0">
+                <a:solidFill>
+                  <a:srgbClr val="000000"/>
+                </a:solidFill>
+              </a:rPr>
+              <a:t>Optische</a:t>
+            </a:r>
+            <a:r>
+              <a:rPr lang="en-US" dirty="0" smtClean="0">
+                <a:solidFill>
+                  <a:srgbClr val="000000"/>
+                </a:solidFill>
+              </a:rPr>
+              <a:t> </a:t>
+            </a:r>
+            <a:r>
+              <a:rPr lang="en-US" dirty="0" err="1">
+                <a:solidFill>
+                  <a:srgbClr val="000000"/>
+                </a:solidFill>
+              </a:rPr>
+              <a:t>Rückmeldung</a:t>
+            </a:r>
+            <a:r>
+              <a:rPr lang="en-US" dirty="0">
+                <a:solidFill>
+                  <a:srgbClr val="000000"/>
+                </a:solidFill>
+              </a:rPr>
+              <a:t> </a:t>
+            </a:r>
+            <a:r>
+              <a:rPr lang="en-US" dirty="0" err="1">
+                <a:solidFill>
+                  <a:srgbClr val="000000"/>
+                </a:solidFill>
+              </a:rPr>
+              <a:t>ob</a:t>
+            </a:r>
+            <a:r>
+              <a:rPr lang="en-US" dirty="0">
+                <a:solidFill>
+                  <a:srgbClr val="000000"/>
+                </a:solidFill>
+              </a:rPr>
+              <a:t> </a:t>
+            </a:r>
+            <a:r>
+              <a:rPr lang="en-US" dirty="0" err="1">
+                <a:solidFill>
+                  <a:srgbClr val="000000"/>
+                </a:solidFill>
+              </a:rPr>
+              <a:t>verzehrbar</a:t>
+            </a:r>
+            <a:endParaRPr lang="en-US" dirty="0"/>
+          </a:p>
+          <a:p>
+            <a:pPr lvl="2">
+              <a:buSzPct val="45000"/>
+              <a:buFont typeface="StarSymbol"/>
+              <a:buChar char=""/>
+            </a:pPr>
+            <a:endParaRPr lang="en-US" dirty="0"/>
+          </a:p>
+          <a:p>
+            <a:pPr>
+              <a:buFont typeface="Arial"/>
+              <a:buChar char="•"/>
+            </a:pPr>
+            <a:r>
+              <a:rPr lang="en-US" dirty="0" err="1">
+                <a:solidFill>
+                  <a:srgbClr val="000000"/>
+                </a:solidFill>
+              </a:rPr>
+              <a:t>Kommunikation</a:t>
+            </a:r>
+            <a:r>
+              <a:rPr lang="en-US" dirty="0">
+                <a:solidFill>
+                  <a:srgbClr val="000000"/>
+                </a:solidFill>
+              </a:rPr>
+              <a:t> via RESTful-API </a:t>
+            </a:r>
+            <a:r>
+              <a:rPr lang="en-US" dirty="0" err="1">
+                <a:solidFill>
+                  <a:srgbClr val="000000"/>
+                </a:solidFill>
+              </a:rPr>
+              <a:t>mit</a:t>
+            </a:r>
+            <a:r>
+              <a:rPr lang="en-US" dirty="0">
+                <a:solidFill>
+                  <a:srgbClr val="000000"/>
+                </a:solidFill>
+              </a:rPr>
+              <a:t> Server</a:t>
+            </a:r>
+            <a:endParaRPr lang="en-US" dirty="0"/>
+          </a:p>
+          <a:p>
+            <a:pPr>
+              <a:buFont typeface="Arial"/>
+              <a:buChar char="•"/>
+            </a:pPr>
+            <a:endParaRPr lang="en-US" dirty="0"/>
+          </a:p>
+          <a:p>
+            <a:pPr>
+              <a:buFont typeface="Arial"/>
+              <a:buChar char="•"/>
+            </a:pPr>
+            <a:r>
+              <a:rPr lang="en-US" dirty="0" err="1">
+                <a:solidFill>
+                  <a:srgbClr val="000000"/>
+                </a:solidFill>
+              </a:rPr>
+              <a:t>Geräte</a:t>
+            </a:r>
+            <a:r>
+              <a:rPr lang="en-US" dirty="0">
+                <a:solidFill>
+                  <a:srgbClr val="000000"/>
+                </a:solidFill>
+              </a:rPr>
+              <a:t>-Account-</a:t>
+            </a:r>
+            <a:r>
+              <a:rPr lang="en-US" dirty="0" err="1">
+                <a:solidFill>
+                  <a:srgbClr val="000000"/>
+                </a:solidFill>
+              </a:rPr>
+              <a:t>Kopplung</a:t>
+            </a:r>
+            <a:r>
+              <a:rPr lang="en-US" dirty="0">
+                <a:solidFill>
+                  <a:srgbClr val="000000"/>
+                </a:solidFill>
+              </a:rPr>
+              <a:t> </a:t>
+            </a:r>
+            <a:r>
+              <a:rPr lang="en-US" dirty="0" err="1">
+                <a:solidFill>
+                  <a:srgbClr val="000000"/>
+                </a:solidFill>
+              </a:rPr>
+              <a:t>mittels</a:t>
+            </a:r>
+            <a:r>
+              <a:rPr lang="en-US" dirty="0">
+                <a:solidFill>
+                  <a:srgbClr val="000000"/>
+                </a:solidFill>
+              </a:rPr>
+              <a:t> Barcode</a:t>
+            </a:r>
+            <a:endParaRPr lang="en-US" dirty="0"/>
           </a:p>
         </p:txBody>
       </p:sp>
     </p:spTree>
     <p:extLst>
       <p:ext uri="{BB962C8B-B14F-4D97-AF65-F5344CB8AC3E}">
-        <p14:creationId xmlns:p14="http://schemas.microsoft.com/office/powerpoint/2010/main" val="173347956"/>
+        <p14:creationId xmlns:p14="http://schemas.microsoft.com/office/powerpoint/2010/main" val="2561323560"/>
       </p:ext>
     </p:extLst>
   </p:cSld>
@@ -4487,51 +4539,99 @@
           <a:p>
             <a:r>
               <a:rPr lang="de-DE" dirty="0"/>
-              <a:t>Übersicht aller Entwicklungsebenen</a:t>
+              <a:t>Ablauf eines </a:t>
+            </a:r>
+            <a:r>
+              <a:rPr lang="de-DE" dirty="0" smtClean="0"/>
+              <a:t>kompletten </a:t>
+            </a:r>
+            <a:r>
+              <a:rPr lang="de-DE" dirty="0" err="1" smtClean="0"/>
+              <a:t>Scrum</a:t>
+            </a:r>
+            <a:r>
+              <a:rPr lang="de-DE" dirty="0" smtClean="0"/>
+              <a:t> Projekts</a:t>
             </a:r>
           </a:p>
           <a:p>
             <a:pPr lvl="1"/>
             <a:r>
+              <a:rPr lang="de-DE" dirty="0" smtClean="0"/>
+              <a:t>6 Sprintwechsel</a:t>
+            </a:r>
+          </a:p>
+          <a:p>
+            <a:pPr lvl="2"/>
+            <a:r>
+              <a:rPr lang="de-DE" dirty="0" smtClean="0"/>
+              <a:t>Abnahme von </a:t>
+            </a:r>
+            <a:r>
+              <a:rPr lang="de-DE" dirty="0" err="1" smtClean="0"/>
+              <a:t>Issues</a:t>
+            </a:r>
+            <a:endParaRPr lang="de-DE" dirty="0" smtClean="0"/>
+          </a:p>
+          <a:p>
+            <a:pPr lvl="2"/>
+            <a:r>
+              <a:rPr lang="de-DE" dirty="0" smtClean="0"/>
+              <a:t>Retrospektive</a:t>
+            </a:r>
+          </a:p>
+          <a:p>
+            <a:pPr lvl="2"/>
+            <a:r>
+              <a:rPr lang="de-DE" dirty="0" smtClean="0"/>
+              <a:t>Verteilung von </a:t>
+            </a:r>
+            <a:r>
+              <a:rPr lang="de-DE" dirty="0" err="1" smtClean="0"/>
+              <a:t>Issues</a:t>
+            </a:r>
+            <a:endParaRPr lang="de-DE" dirty="0" smtClean="0"/>
+          </a:p>
+          <a:p>
+            <a:pPr lvl="2"/>
+            <a:endParaRPr lang="de-DE" dirty="0" smtClean="0"/>
+          </a:p>
+          <a:p>
+            <a:r>
+              <a:rPr lang="de-DE" dirty="0" smtClean="0"/>
+              <a:t>Projekt </a:t>
+            </a:r>
+            <a:r>
               <a:rPr lang="de-DE" dirty="0"/>
-              <a:t>Jeder hatte Aufgabenbereiche in jeder </a:t>
+              <a:t>Retrospektive</a:t>
+            </a:r>
+          </a:p>
+          <a:p>
+            <a:pPr lvl="1"/>
+            <a:r>
+              <a:rPr lang="de-DE" dirty="0"/>
+              <a:t>Abwägung ob </a:t>
+            </a:r>
+            <a:r>
+              <a:rPr lang="de-DE" dirty="0" err="1"/>
+              <a:t>Scrum</a:t>
+            </a:r>
+            <a:r>
+              <a:rPr lang="de-DE" dirty="0"/>
+              <a:t> für </a:t>
             </a:r>
             <a:r>
               <a:rPr lang="de-DE" dirty="0" smtClean="0"/>
-              <a:t>Entwicklungsebene</a:t>
-            </a:r>
-          </a:p>
-          <a:p>
-            <a:pPr lvl="1"/>
-            <a:endParaRPr lang="de-DE" dirty="0" smtClean="0"/>
-          </a:p>
-          <a:p>
-            <a:r>
-              <a:rPr lang="de-DE" dirty="0" err="1" smtClean="0"/>
-              <a:t>GitHub</a:t>
-            </a:r>
-            <a:endParaRPr lang="de-DE" dirty="0" smtClean="0"/>
-          </a:p>
-          <a:p>
-            <a:pPr lvl="1"/>
-            <a:r>
-              <a:rPr lang="de-DE" dirty="0" err="1" smtClean="0"/>
-              <a:t>ZenHub</a:t>
-            </a:r>
-            <a:endParaRPr lang="de-DE" dirty="0" smtClean="0"/>
-          </a:p>
-          <a:p>
-            <a:pPr lvl="1"/>
-            <a:endParaRPr lang="de-DE" dirty="0" smtClean="0"/>
-          </a:p>
-          <a:p>
-            <a:r>
-              <a:rPr lang="de-DE" dirty="0" err="1" smtClean="0"/>
-              <a:t>StarUML</a:t>
-            </a:r>
-            <a:endParaRPr lang="de-DE" dirty="0" smtClean="0"/>
-          </a:p>
-          <a:p>
+              <a:t>kleine/studentische </a:t>
+            </a:r>
+            <a:r>
+              <a:rPr lang="de-DE" dirty="0"/>
+              <a:t>Projekte </a:t>
+            </a:r>
+            <a:r>
+              <a:rPr lang="de-DE" dirty="0" smtClean="0"/>
+              <a:t>geeignet</a:t>
+            </a:r>
             <a:endParaRPr lang="de-DE" dirty="0"/>
           </a:p>
         </p:txBody>
@@ -4539,7 +4639,7 @@
     </p:spTree>
     <p:extLst>
       <p:ext uri="{BB962C8B-B14F-4D97-AF65-F5344CB8AC3E}">
-        <p14:creationId xmlns:p14="http://schemas.microsoft.com/office/powerpoint/2010/main" val="2853418997"/>
+        <p14:creationId xmlns:p14="http://schemas.microsoft.com/office/powerpoint/2010/main" val="173347956"/>
       </p:ext>
     </p:extLst>
   </p:cSld>
@@ -4591,6 +4691,144 @@
           <a:lstStyle/>
           <a:p>
             <a:r>
+              <a:rPr lang="de-DE" dirty="0" err="1" smtClean="0"/>
+              <a:t>Lesson</a:t>
+            </a:r>
+            <a:r>
+              <a:rPr lang="de-DE" dirty="0" smtClean="0"/>
+              <a:t> </a:t>
+            </a:r>
+            <a:r>
+              <a:rPr lang="de-DE" dirty="0" err="1" smtClean="0"/>
+              <a:t>learned</a:t>
+            </a:r>
+            <a:endParaRPr lang="de-DE" dirty="0"/>
+          </a:p>
+        </p:txBody>
+      </p:sp>
+      <p:sp>
+        <p:nvSpPr>
+          <p:cNvPr id="3" name="Inhaltsplatzhalter 2"/>
+          <p:cNvSpPr>
+            <a:spLocks noGrp="1"/>
+          </p:cNvSpPr>
+          <p:nvPr>
+            <p:ph idx="1"/>
+          </p:nvPr>
+        </p:nvSpPr>
+        <p:spPr/>
+        <p:txBody>
+          <a:bodyPr>
+            <a:normAutofit/>
+          </a:bodyPr>
+          <a:lstStyle/>
+          <a:p>
+            <a:r>
+              <a:rPr lang="de-DE" dirty="0"/>
+              <a:t>Übersicht aller Entwicklungsebenen</a:t>
+            </a:r>
+          </a:p>
+          <a:p>
+            <a:pPr lvl="1"/>
+            <a:r>
+              <a:rPr lang="de-DE" dirty="0"/>
+              <a:t>Jeder hatte Aufgabenbereiche in jeder </a:t>
+            </a:r>
+            <a:r>
+              <a:rPr lang="de-DE" dirty="0" smtClean="0"/>
+              <a:t>Entwicklungsebene</a:t>
+            </a:r>
+          </a:p>
+          <a:p>
+            <a:pPr lvl="1"/>
+            <a:endParaRPr lang="de-DE" dirty="0" smtClean="0"/>
+          </a:p>
+          <a:p>
+            <a:r>
+              <a:rPr lang="de-DE" dirty="0" err="1" smtClean="0"/>
+              <a:t>GitHub</a:t>
+            </a:r>
+            <a:endParaRPr lang="de-DE" dirty="0" smtClean="0"/>
+          </a:p>
+          <a:p>
+            <a:pPr lvl="1"/>
+            <a:r>
+              <a:rPr lang="de-DE" dirty="0" err="1" smtClean="0"/>
+              <a:t>ZenHub</a:t>
+            </a:r>
+            <a:endParaRPr lang="de-DE" dirty="0" smtClean="0"/>
+          </a:p>
+          <a:p>
+            <a:pPr lvl="1"/>
+            <a:endParaRPr lang="de-DE" dirty="0" smtClean="0"/>
+          </a:p>
+          <a:p>
+            <a:r>
+              <a:rPr lang="de-DE" dirty="0" err="1" smtClean="0"/>
+              <a:t>StarUML</a:t>
+            </a:r>
+            <a:endParaRPr lang="de-DE" dirty="0" smtClean="0"/>
+          </a:p>
+          <a:p>
+            <a:endParaRPr lang="de-DE" dirty="0"/>
+          </a:p>
+        </p:txBody>
+      </p:sp>
+    </p:spTree>
+    <p:extLst>
+      <p:ext uri="{BB962C8B-B14F-4D97-AF65-F5344CB8AC3E}">
+        <p14:creationId xmlns:p14="http://schemas.microsoft.com/office/powerpoint/2010/main" val="2853418997"/>
+      </p:ext>
+    </p:extLst>
+  </p:cSld>
+  <p:clrMapOvr>
+    <a:masterClrMapping/>
+  </p:clrMapOvr>
+  <p:timing>
+    <p:tnLst>
+      <p:par>
+        <p:cTn id="1" dur="indefinite" restart="never" nodeType="tmRoot"/>
+      </p:par>
+    </p:tnLst>
+  </p:timing>
+</p:sld>
+</file>
+
+<file path=ppt/slides/slide16.xml><?xml version="1.0" encoding="utf-8"?>
+<p:sld xmlns:a="http://schemas.openxmlformats.org/drawingml/2006/main" xmlns:r="http://schemas.openxmlformats.org/officeDocument/2006/relationships" xmlns:p="http://schemas.openxmlformats.org/presentationml/2006/main">
+  <p:cSld>
+    <p:spTree>
+      <p:nvGrpSpPr>
+        <p:cNvPr id="1" name=""/>
+        <p:cNvGrpSpPr/>
+        <p:nvPr/>
+      </p:nvGrpSpPr>
+      <p:grpSpPr>
+        <a:xfrm>
+          <a:off x="0" y="0"/>
+          <a:ext cx="0" cy="0"/>
+          <a:chOff x="0" y="0"/>
+          <a:chExt cx="0" cy="0"/>
+        </a:xfrm>
+      </p:grpSpPr>
+      <p:sp>
+        <p:nvSpPr>
+          <p:cNvPr id="2" name="Titel 1"/>
+          <p:cNvSpPr>
+            <a:spLocks noGrp="1"/>
+          </p:cNvSpPr>
+          <p:nvPr>
+            <p:ph type="title"/>
+          </p:nvPr>
+        </p:nvSpPr>
+        <p:spPr/>
+        <p:txBody>
+          <a:bodyPr>
+            <a:normAutofit/>
+          </a:bodyPr>
+          <a:lstStyle/>
+          <a:p>
+            <a:r>
               <a:rPr lang="de-DE" dirty="0" smtClean="0"/>
               <a:t>Future Vision</a:t>
             </a:r>
@@ -4673,7 +4911,7 @@
 </p:sld>
 </file>
 
-<file path=ppt/slides/slide16.xml><?xml version="1.0" encoding="utf-8"?>
+<file path=ppt/slides/slide17.xml><?xml version="1.0" encoding="utf-8"?>
 <p:sld xmlns:a="http://schemas.openxmlformats.org/drawingml/2006/main" xmlns:r="http://schemas.openxmlformats.org/officeDocument/2006/relationships" xmlns:p="http://schemas.openxmlformats.org/presentationml/2006/main">
   <p:cSld>
     <p:spTree>
@@ -10032,6 +10270,140 @@
 </file>
 
 <file path=ppt/slides/slide8.xml><?xml version="1.0" encoding="utf-8"?>
+<p:sld xmlns:a="http://schemas.openxmlformats.org/drawingml/2006/main" xmlns:r="http://schemas.openxmlformats.org/officeDocument/2006/relationships" xmlns:p="http://schemas.openxmlformats.org/presentationml/2006/main">
+  <p:cSld>
+    <p:spTree>
+      <p:nvGrpSpPr>
+        <p:cNvPr id="1" name=""/>
+        <p:cNvGrpSpPr/>
+        <p:nvPr/>
+      </p:nvGrpSpPr>
+      <p:grpSpPr>
+        <a:xfrm>
+          <a:off x="0" y="0"/>
+          <a:ext cx="0" cy="0"/>
+          <a:chOff x="0" y="0"/>
+          <a:chExt cx="0" cy="0"/>
+        </a:xfrm>
+      </p:grpSpPr>
+      <p:sp>
+        <p:nvSpPr>
+          <p:cNvPr id="3" name="Inhaltsplatzhalter 2"/>
+          <p:cNvSpPr>
+            <a:spLocks noGrp="1"/>
+          </p:cNvSpPr>
+          <p:nvPr>
+            <p:ph idx="1"/>
+          </p:nvPr>
+        </p:nvSpPr>
+        <p:spPr/>
+        <p:txBody>
+          <a:bodyPr/>
+          <a:lstStyle/>
+          <a:p>
+            <a:endParaRPr lang="de-DE"/>
+          </a:p>
+        </p:txBody>
+      </p:sp>
+      <p:sp>
+        <p:nvSpPr>
+          <p:cNvPr id="4" name="Titel 1"/>
+          <p:cNvSpPr txBox="1">
+            <a:spLocks/>
+          </p:cNvSpPr>
+          <p:nvPr/>
+        </p:nvSpPr>
+        <p:spPr>
+          <a:xfrm>
+            <a:off x="0" y="0"/>
+            <a:ext cx="12192000" cy="1325563"/>
+          </a:xfrm>
+          <a:prstGeom prst="rect">
+            <a:avLst/>
+          </a:prstGeom>
+        </p:spPr>
+        <p:txBody>
+          <a:bodyPr vert="horz" lIns="91440" tIns="45720" rIns="91440" bIns="45720" rtlCol="0" anchor="ctr">
+            <a:normAutofit/>
+          </a:bodyPr>
+          <a:lstStyle>
+            <a:lvl1pPr algn="ctr" defTabSz="914400" rtl="0" eaLnBrk="1" latinLnBrk="0" hangingPunct="1">
+              <a:lnSpc>
+                <a:spcPct val="90000"/>
+              </a:lnSpc>
+              <a:spcBef>
+                <a:spcPct val="0"/>
+              </a:spcBef>
+              <a:buNone/>
+              <a:defRPr sz="4400" b="1" kern="1200">
+                <a:solidFill>
+                  <a:schemeClr val="tx1"/>
+                </a:solidFill>
+                <a:latin typeface="+mj-lt"/>
+                <a:ea typeface="+mj-ea"/>
+                <a:cs typeface="+mj-cs"/>
+              </a:defRPr>
+            </a:lvl1pPr>
+          </a:lstStyle>
+          <a:p>
+            <a:r>
+              <a:rPr lang="de-DE" smtClean="0"/>
+              <a:t>Live-Demo</a:t>
+            </a:r>
+            <a:endParaRPr lang="de-DE" dirty="0"/>
+          </a:p>
+        </p:txBody>
+      </p:sp>
+      <p:pic>
+        <p:nvPicPr>
+          <p:cNvPr id="5" name="Inhaltsplatzhalter 3"/>
+          <p:cNvPicPr>
+            <a:picLocks noChangeAspect="1"/>
+          </p:cNvPicPr>
+          <p:nvPr/>
+        </p:nvPicPr>
+        <p:blipFill rotWithShape="1">
+          <a:blip r:embed="rId2">
+            <a:extLst>
+              <a:ext uri="{28A0092B-C50C-407E-A947-70E740481C1C}">
+                <a14:useLocalDpi xmlns:a14="http://schemas.microsoft.com/office/drawing/2010/main" val="0"/>
+              </a:ext>
+            </a:extLst>
+          </a:blip>
+          <a:srcRect t="-370" b="-1"/>
+          <a:stretch/>
+        </p:blipFill>
+        <p:spPr>
+          <a:xfrm>
+            <a:off x="846165" y="1274584"/>
+            <a:ext cx="10485911" cy="5017034"/>
+          </a:xfrm>
+          <a:prstGeom prst="rect">
+            <a:avLst/>
+          </a:prstGeom>
+        </p:spPr>
+      </p:pic>
+    </p:spTree>
+    <p:extLst>
+      <p:ext uri="{BB962C8B-B14F-4D97-AF65-F5344CB8AC3E}">
+        <p14:creationId xmlns:p14="http://schemas.microsoft.com/office/powerpoint/2010/main" val="643753129"/>
+      </p:ext>
+    </p:extLst>
+  </p:cSld>
+  <p:clrMapOvr>
+    <a:masterClrMapping/>
+  </p:clrMapOvr>
+  <p:timing>
+    <p:tnLst>
+      <p:par>
+        <p:cTn id="1" dur="indefinite" restart="never" nodeType="tmRoot"/>
+      </p:par>
+    </p:tnLst>
+  </p:timing>
+</p:sld>
+</file>
+
+<file path=ppt/slides/slide9.xml><?xml version="1.0" encoding="utf-8"?>
 <p:sld xmlns:a="http://schemas.openxmlformats.org/drawingml/2006/main" xmlns:r="http://schemas.openxmlformats.org/officeDocument/2006/relationships" xmlns:p="http://schemas.openxmlformats.org/presentationml/2006/main">
   <p:cSld>
     <p:spTree>
@@ -10424,243 +10796,6 @@
 </p:sld>
 </file>
 
-<file path=ppt/slides/slide9.xml><?xml version="1.0" encoding="utf-8"?>
-<p:sld xmlns:a="http://schemas.openxmlformats.org/drawingml/2006/main" xmlns:r="http://schemas.openxmlformats.org/officeDocument/2006/relationships" xmlns:p="http://schemas.openxmlformats.org/presentationml/2006/main">
-  <p:cSld>
-    <p:spTree>
-      <p:nvGrpSpPr>
-        <p:cNvPr id="1" name=""/>
-        <p:cNvGrpSpPr/>
-        <p:nvPr/>
-      </p:nvGrpSpPr>
-      <p:grpSpPr>
-        <a:xfrm>
-          <a:off x="0" y="0"/>
-          <a:ext cx="0" cy="0"/>
-          <a:chOff x="0" y="0"/>
-          <a:chExt cx="0" cy="0"/>
-        </a:xfrm>
-      </p:grpSpPr>
-      <p:sp>
-        <p:nvSpPr>
-          <p:cNvPr id="2" name="Titel 1"/>
-          <p:cNvSpPr>
-            <a:spLocks noGrp="1"/>
-          </p:cNvSpPr>
-          <p:nvPr>
-            <p:ph type="title"/>
-          </p:nvPr>
-        </p:nvSpPr>
-        <p:spPr/>
-        <p:txBody>
-          <a:bodyPr/>
-          <a:lstStyle/>
-          <a:p>
-            <a:r>
-              <a:rPr lang="de-DE" dirty="0" smtClean="0"/>
-              <a:t>Datenbank</a:t>
-            </a:r>
-            <a:endParaRPr lang="de-DE" dirty="0"/>
-          </a:p>
-        </p:txBody>
-      </p:sp>
-      <p:sp>
-        <p:nvSpPr>
-          <p:cNvPr id="3" name="Inhaltsplatzhalter 2"/>
-          <p:cNvSpPr>
-            <a:spLocks noGrp="1"/>
-          </p:cNvSpPr>
-          <p:nvPr>
-            <p:ph idx="1"/>
-          </p:nvPr>
-        </p:nvSpPr>
-        <p:spPr/>
-        <p:txBody>
-          <a:bodyPr>
-            <a:normAutofit lnSpcReduction="10000"/>
-          </a:bodyPr>
-          <a:lstStyle/>
-          <a:p>
-            <a:pPr>
-              <a:buFont typeface="Arial"/>
-              <a:buChar char="•"/>
-            </a:pPr>
-            <a:r>
-              <a:rPr lang="de-DE" dirty="0">
-                <a:solidFill>
-                  <a:srgbClr val="000000"/>
-                </a:solidFill>
-              </a:rPr>
-              <a:t>Ablegen von</a:t>
-            </a:r>
-            <a:endParaRPr lang="de-DE" dirty="0"/>
-          </a:p>
-          <a:p>
-            <a:pPr>
-              <a:buFont typeface="Arial"/>
-              <a:buChar char="•"/>
-            </a:pPr>
-            <a:endParaRPr lang="de-DE" dirty="0"/>
-          </a:p>
-          <a:p>
-            <a:pPr>
-              <a:buFont typeface="Arial"/>
-              <a:buChar char="•"/>
-            </a:pPr>
-            <a:r>
-              <a:rPr lang="de-DE" dirty="0" err="1" smtClean="0">
-                <a:solidFill>
-                  <a:srgbClr val="000000"/>
-                </a:solidFill>
-              </a:rPr>
-              <a:t>Produktionformationen</a:t>
-            </a:r>
-            <a:endParaRPr lang="de-DE" dirty="0"/>
-          </a:p>
-          <a:p>
-            <a:pPr lvl="1">
-              <a:buFont typeface="Arial"/>
-              <a:buChar char="•"/>
-            </a:pPr>
-            <a:r>
-              <a:rPr lang="de-DE" sz="2400" dirty="0" smtClean="0">
-                <a:solidFill>
-                  <a:srgbClr val="000000"/>
-                </a:solidFill>
-              </a:rPr>
-              <a:t>Produkte</a:t>
-            </a:r>
-            <a:endParaRPr lang="de-DE" dirty="0" smtClean="0"/>
-          </a:p>
-          <a:p>
-            <a:pPr lvl="1">
-              <a:buFont typeface="Arial"/>
-              <a:buChar char="•"/>
-            </a:pPr>
-            <a:r>
-              <a:rPr lang="de-DE" dirty="0" smtClean="0">
-                <a:solidFill>
-                  <a:srgbClr val="000000"/>
-                </a:solidFill>
-              </a:rPr>
-              <a:t>Inhaltsstoffe </a:t>
-            </a:r>
-            <a:r>
-              <a:rPr lang="de-DE" dirty="0">
-                <a:solidFill>
-                  <a:srgbClr val="000000"/>
-                </a:solidFill>
-              </a:rPr>
-              <a:t>(inkl. </a:t>
-            </a:r>
-            <a:r>
-              <a:rPr lang="de-DE" dirty="0" smtClean="0">
-                <a:solidFill>
-                  <a:srgbClr val="000000"/>
-                </a:solidFill>
-              </a:rPr>
-              <a:t>Allergiegruppe)</a:t>
-            </a:r>
-            <a:endParaRPr lang="de-DE" dirty="0" smtClean="0"/>
-          </a:p>
-          <a:p>
-            <a:pPr lvl="1">
-              <a:buFont typeface="Arial"/>
-              <a:buChar char="•"/>
-            </a:pPr>
-            <a:r>
-              <a:rPr lang="de-DE" dirty="0" smtClean="0">
-                <a:solidFill>
-                  <a:srgbClr val="000000"/>
-                </a:solidFill>
-              </a:rPr>
-              <a:t>Barcode</a:t>
-            </a:r>
-            <a:endParaRPr lang="de-DE" dirty="0"/>
-          </a:p>
-          <a:p>
-            <a:pPr lvl="1">
-              <a:buSzPct val="45000"/>
-              <a:buFont typeface="StarSymbol"/>
-              <a:buChar char=""/>
-            </a:pPr>
-            <a:endParaRPr lang="de-DE" dirty="0"/>
-          </a:p>
-          <a:p>
-            <a:pPr>
-              <a:buFont typeface="Arial"/>
-              <a:buChar char="•"/>
-            </a:pPr>
-            <a:r>
-              <a:rPr lang="de-DE" dirty="0" smtClean="0">
-                <a:solidFill>
-                  <a:srgbClr val="000000"/>
-                </a:solidFill>
-              </a:rPr>
-              <a:t>Userinformationen</a:t>
-            </a:r>
-            <a:endParaRPr lang="de-DE" dirty="0" smtClean="0"/>
-          </a:p>
-          <a:p>
-            <a:pPr lvl="1">
-              <a:buFont typeface="Arial"/>
-              <a:buChar char="•"/>
-            </a:pPr>
-            <a:r>
-              <a:rPr lang="de-DE" dirty="0" smtClean="0">
-                <a:solidFill>
-                  <a:srgbClr val="000000"/>
-                </a:solidFill>
-              </a:rPr>
-              <a:t>Authentifizierungsdaten</a:t>
-            </a:r>
-            <a:endParaRPr lang="de-DE" dirty="0" smtClean="0"/>
-          </a:p>
-          <a:p>
-            <a:pPr lvl="1">
-              <a:buFont typeface="Arial"/>
-              <a:buChar char="•"/>
-            </a:pPr>
-            <a:r>
-              <a:rPr lang="de-DE" dirty="0" smtClean="0">
-                <a:solidFill>
-                  <a:srgbClr val="000000"/>
-                </a:solidFill>
-              </a:rPr>
-              <a:t>Gekoppelte </a:t>
-            </a:r>
-            <a:r>
-              <a:rPr lang="de-DE" dirty="0">
-                <a:solidFill>
-                  <a:srgbClr val="000000"/>
-                </a:solidFill>
-              </a:rPr>
-              <a:t>Geräte</a:t>
-            </a:r>
-            <a:endParaRPr lang="de-DE" dirty="0"/>
-          </a:p>
-        </p:txBody>
-      </p:sp>
-    </p:spTree>
-    <p:extLst>
-      <p:ext uri="{BB962C8B-B14F-4D97-AF65-F5344CB8AC3E}">
-        <p14:creationId xmlns:p14="http://schemas.microsoft.com/office/powerpoint/2010/main" val="1588141210"/>
-      </p:ext>
-    </p:extLst>
-  </p:cSld>
-  <p:clrMapOvr>
-    <a:masterClrMapping/>
-  </p:clrMapOvr>
-  <p:timing>
-    <p:tnLst>
-      <p:par>
-        <p:cTn id="1" dur="indefinite" restart="never" nodeType="tmRoot"/>
-      </p:par>
-    </p:tnLst>
-  </p:timing>
-</p:sld>
-</file>
-
 <file path=ppt/theme/theme1.xml><?xml version="1.0" encoding="utf-8"?>
 <a:theme xmlns:a="http://schemas.openxmlformats.org/drawingml/2006/main" name="Office Theme">
   <a:themeElements>
@@ -10856,7 +10991,7 @@
   <a:extraClrSchemeLst/>
   <a:extLst>
     <a:ext uri="{05A4C25C-085E-4340-85A3-A5531E510DB2}">
-      <thm15:themeFamily xmlns="" xmlns:thm15="http://schemas.microsoft.com/office/thememl/2012/main" name="Office Theme" id="{62F939B6-93AF-4DB8-9C6B-D6C7DFDC589F}" vid="{4A3C46E8-61CC-4603-A589-7422A47A8E4A}"/>
+      <thm15:themeFamily xmlns:thm15="http://schemas.microsoft.com/office/thememl/2012/main" xmlns="" name="Office Theme" id="{62F939B6-93AF-4DB8-9C6B-D6C7DFDC589F}" vid="{4A3C46E8-61CC-4603-A589-7422A47A8E4A}"/>
     </a:ext>
   </a:extLst>
 </a:theme>

</xml_diff>